<commit_message>
Convert wk12 pptx to pdf
</commit_message>
<xml_diff>
--- a/wk12/設計說明.pptx
+++ b/wk12/設計說明.pptx
@@ -3733,13 +3733,13 @@
   <p:clrMapOvr>
     <a:masterClrMapping/>
   </p:clrMapOvr>
-  <mc:AlternateContent xmlns:mc="http://schemas.openxmlformats.org/markup-compatibility/2006">
-    <mc:Choice xmlns:p14="http://schemas.microsoft.com/office/powerpoint/2010/main" Requires="p14">
+  <mc:AlternateContent xmlns:mc="http://schemas.openxmlformats.org/markup-compatibility/2006" xmlns:p14="http://schemas.microsoft.com/office/powerpoint/2010/main">
+    <mc:Choice Requires="p14">
       <p:transition p14:dur="100">
         <p:cut/>
       </p:transition>
     </mc:Choice>
-    <mc:Fallback>
+    <mc:Fallback xmlns="">
       <p:transition>
         <p:cut/>
       </p:transition>
@@ -4364,13 +4364,13 @@
   <p:clrMapOvr>
     <a:masterClrMapping/>
   </p:clrMapOvr>
-  <mc:AlternateContent xmlns:mc="http://schemas.openxmlformats.org/markup-compatibility/2006">
-    <mc:Choice xmlns:p14="http://schemas.microsoft.com/office/powerpoint/2010/main" Requires="p14">
+  <mc:AlternateContent xmlns:mc="http://schemas.openxmlformats.org/markup-compatibility/2006" xmlns:p14="http://schemas.microsoft.com/office/powerpoint/2010/main">
+    <mc:Choice Requires="p14">
       <p:transition p14:dur="100">
         <p:cut/>
       </p:transition>
     </mc:Choice>
-    <mc:Fallback>
+    <mc:Fallback xmlns="">
       <p:transition>
         <p:cut/>
       </p:transition>

</xml_diff>